<commit_message>
Some Results with LLM generated Data
</commit_message>
<xml_diff>
--- a/fig/Figures.pptx
+++ b/fig/Figures.pptx
@@ -6,6 +6,26 @@
   </p:sldMasterIdLst>
   <p:sldIdLst>
     <p:sldId id="256" r:id="rId2"/>
+    <p:sldId id="257" r:id="rId3"/>
+    <p:sldId id="258" r:id="rId4"/>
+    <p:sldId id="259" r:id="rId5"/>
+    <p:sldId id="260" r:id="rId6"/>
+    <p:sldId id="261" r:id="rId7"/>
+    <p:sldId id="262" r:id="rId8"/>
+    <p:sldId id="263" r:id="rId9"/>
+    <p:sldId id="264" r:id="rId10"/>
+    <p:sldId id="265" r:id="rId11"/>
+    <p:sldId id="266" r:id="rId12"/>
+    <p:sldId id="267" r:id="rId13"/>
+    <p:sldId id="270" r:id="rId14"/>
+    <p:sldId id="268" r:id="rId15"/>
+    <p:sldId id="269" r:id="rId16"/>
+    <p:sldId id="280" r:id="rId17"/>
+    <p:sldId id="279" r:id="rId18"/>
+    <p:sldId id="281" r:id="rId19"/>
+    <p:sldId id="282" r:id="rId20"/>
+    <p:sldId id="283" r:id="rId21"/>
+    <p:sldId id="284" r:id="rId22"/>
   </p:sldIdLst>
   <p:sldSz cx="12192000" cy="6858000"/>
   <p:notesSz cx="6858000" cy="9144000"/>
@@ -104,6 +124,11 @@
       </a:defRPr>
     </a:lvl9pPr>
   </p:defaultTextStyle>
+  <p:extLst>
+    <p:ext uri="{EFAFB233-063F-42B5-8137-9DF3F51BA10A}">
+      <p15:sldGuideLst xmlns:p15="http://schemas.microsoft.com/office/powerpoint/2012/main"/>
+    </p:ext>
+  </p:extLst>
 </p:presentation>
 </file>
 
@@ -254,7 +279,7 @@
           <a:p>
             <a:fld id="{1D1862A5-5794-4A10-8861-56572CF35567}" type="datetimeFigureOut">
               <a:rPr lang="en-US" smtClean="0"/>
-              <a:t>3/8/2024</a:t>
+              <a:t>3/18/2024</a:t>
             </a:fld>
             <a:endParaRPr lang="en-US"/>
           </a:p>
@@ -452,7 +477,7 @@
           <a:p>
             <a:fld id="{1D1862A5-5794-4A10-8861-56572CF35567}" type="datetimeFigureOut">
               <a:rPr lang="en-US" smtClean="0"/>
-              <a:t>3/8/2024</a:t>
+              <a:t>3/18/2024</a:t>
             </a:fld>
             <a:endParaRPr lang="en-US"/>
           </a:p>
@@ -660,7 +685,7 @@
           <a:p>
             <a:fld id="{1D1862A5-5794-4A10-8861-56572CF35567}" type="datetimeFigureOut">
               <a:rPr lang="en-US" smtClean="0"/>
-              <a:t>3/8/2024</a:t>
+              <a:t>3/18/2024</a:t>
             </a:fld>
             <a:endParaRPr lang="en-US"/>
           </a:p>
@@ -858,7 +883,7 @@
           <a:p>
             <a:fld id="{1D1862A5-5794-4A10-8861-56572CF35567}" type="datetimeFigureOut">
               <a:rPr lang="en-US" smtClean="0"/>
-              <a:t>3/8/2024</a:t>
+              <a:t>3/18/2024</a:t>
             </a:fld>
             <a:endParaRPr lang="en-US"/>
           </a:p>
@@ -1133,7 +1158,7 @@
           <a:p>
             <a:fld id="{1D1862A5-5794-4A10-8861-56572CF35567}" type="datetimeFigureOut">
               <a:rPr lang="en-US" smtClean="0"/>
-              <a:t>3/8/2024</a:t>
+              <a:t>3/18/2024</a:t>
             </a:fld>
             <a:endParaRPr lang="en-US"/>
           </a:p>
@@ -1398,7 +1423,7 @@
           <a:p>
             <a:fld id="{1D1862A5-5794-4A10-8861-56572CF35567}" type="datetimeFigureOut">
               <a:rPr lang="en-US" smtClean="0"/>
-              <a:t>3/8/2024</a:t>
+              <a:t>3/18/2024</a:t>
             </a:fld>
             <a:endParaRPr lang="en-US"/>
           </a:p>
@@ -1810,7 +1835,7 @@
           <a:p>
             <a:fld id="{1D1862A5-5794-4A10-8861-56572CF35567}" type="datetimeFigureOut">
               <a:rPr lang="en-US" smtClean="0"/>
-              <a:t>3/8/2024</a:t>
+              <a:t>3/18/2024</a:t>
             </a:fld>
             <a:endParaRPr lang="en-US"/>
           </a:p>
@@ -1951,7 +1976,7 @@
           <a:p>
             <a:fld id="{1D1862A5-5794-4A10-8861-56572CF35567}" type="datetimeFigureOut">
               <a:rPr lang="en-US" smtClean="0"/>
-              <a:t>3/8/2024</a:t>
+              <a:t>3/18/2024</a:t>
             </a:fld>
             <a:endParaRPr lang="en-US"/>
           </a:p>
@@ -2064,7 +2089,7 @@
           <a:p>
             <a:fld id="{1D1862A5-5794-4A10-8861-56572CF35567}" type="datetimeFigureOut">
               <a:rPr lang="en-US" smtClean="0"/>
-              <a:t>3/8/2024</a:t>
+              <a:t>3/18/2024</a:t>
             </a:fld>
             <a:endParaRPr lang="en-US"/>
           </a:p>
@@ -2375,7 +2400,7 @@
           <a:p>
             <a:fld id="{1D1862A5-5794-4A10-8861-56572CF35567}" type="datetimeFigureOut">
               <a:rPr lang="en-US" smtClean="0"/>
-              <a:t>3/8/2024</a:t>
+              <a:t>3/18/2024</a:t>
             </a:fld>
             <a:endParaRPr lang="en-US"/>
           </a:p>
@@ -2663,7 +2688,7 @@
           <a:p>
             <a:fld id="{1D1862A5-5794-4A10-8861-56572CF35567}" type="datetimeFigureOut">
               <a:rPr lang="en-US" smtClean="0"/>
-              <a:t>3/8/2024</a:t>
+              <a:t>3/18/2024</a:t>
             </a:fld>
             <a:endParaRPr lang="en-US"/>
           </a:p>
@@ -2904,7 +2929,7 @@
           <a:p>
             <a:fld id="{1D1862A5-5794-4A10-8861-56572CF35567}" type="datetimeFigureOut">
               <a:rPr lang="en-US" smtClean="0"/>
-              <a:t>3/8/2024</a:t>
+              <a:t>3/18/2024</a:t>
             </a:fld>
             <a:endParaRPr lang="en-US"/>
           </a:p>
@@ -3405,6 +3430,2152 @@
     <p:extLst>
       <p:ext uri="{BB962C8B-B14F-4D97-AF65-F5344CB8AC3E}">
         <p14:creationId xmlns:p14="http://schemas.microsoft.com/office/powerpoint/2010/main" val="2448837356"/>
+      </p:ext>
+    </p:extLst>
+  </p:cSld>
+  <p:clrMapOvr>
+    <a:masterClrMapping/>
+  </p:clrMapOvr>
+</p:sld>
+</file>
+
+<file path=ppt/slides/slide10.xml><?xml version="1.0" encoding="utf-8"?>
+<p:sld xmlns:a="http://schemas.openxmlformats.org/drawingml/2006/main" xmlns:r="http://schemas.openxmlformats.org/officeDocument/2006/relationships" xmlns:p="http://schemas.openxmlformats.org/presentationml/2006/main">
+  <p:cSld>
+    <p:spTree>
+      <p:nvGrpSpPr>
+        <p:cNvPr id="1" name=""/>
+        <p:cNvGrpSpPr/>
+        <p:nvPr/>
+      </p:nvGrpSpPr>
+      <p:grpSpPr>
+        <a:xfrm>
+          <a:off x="0" y="0"/>
+          <a:ext cx="0" cy="0"/>
+          <a:chOff x="0" y="0"/>
+          <a:chExt cx="0" cy="0"/>
+        </a:xfrm>
+      </p:grpSpPr>
+      <p:sp>
+        <p:nvSpPr>
+          <p:cNvPr id="2" name="Title 1">
+            <a:extLst>
+              <a:ext uri="{FF2B5EF4-FFF2-40B4-BE49-F238E27FC236}">
+                <a16:creationId xmlns:a16="http://schemas.microsoft.com/office/drawing/2014/main" id="{3F961845-EC97-0315-5E8F-6C5D71DB6279}"/>
+              </a:ext>
+            </a:extLst>
+          </p:cNvPr>
+          <p:cNvSpPr>
+            <a:spLocks noGrp="1"/>
+          </p:cNvSpPr>
+          <p:nvPr>
+            <p:ph type="ctrTitle"/>
+          </p:nvPr>
+        </p:nvSpPr>
+        <p:spPr/>
+        <p:txBody>
+          <a:bodyPr/>
+          <a:lstStyle/>
+          <a:p>
+            <a:endParaRPr lang="en-US" dirty="0"/>
+          </a:p>
+        </p:txBody>
+      </p:sp>
+      <p:pic>
+        <p:nvPicPr>
+          <p:cNvPr id="16" name="Picture 15">
+            <a:extLst>
+              <a:ext uri="{FF2B5EF4-FFF2-40B4-BE49-F238E27FC236}">
+                <a16:creationId xmlns:a16="http://schemas.microsoft.com/office/drawing/2014/main" id="{CBCE6382-AD0B-4F2D-249E-D8B3B8D0A7B2}"/>
+              </a:ext>
+            </a:extLst>
+          </p:cNvPr>
+          <p:cNvPicPr>
+            <a:picLocks noChangeAspect="1"/>
+          </p:cNvPicPr>
+          <p:nvPr/>
+        </p:nvPicPr>
+        <p:blipFill>
+          <a:blip r:embed="rId2"/>
+          <a:stretch>
+            <a:fillRect/>
+          </a:stretch>
+        </p:blipFill>
+        <p:spPr>
+          <a:xfrm>
+            <a:off x="0" y="236274"/>
+            <a:ext cx="12192000" cy="6096000"/>
+          </a:xfrm>
+          <a:prstGeom prst="rect">
+            <a:avLst/>
+          </a:prstGeom>
+        </p:spPr>
+      </p:pic>
+    </p:spTree>
+    <p:extLst>
+      <p:ext uri="{BB962C8B-B14F-4D97-AF65-F5344CB8AC3E}">
+        <p14:creationId xmlns:p14="http://schemas.microsoft.com/office/powerpoint/2010/main" val="1065977989"/>
+      </p:ext>
+    </p:extLst>
+  </p:cSld>
+  <p:clrMapOvr>
+    <a:masterClrMapping/>
+  </p:clrMapOvr>
+</p:sld>
+</file>
+
+<file path=ppt/slides/slide11.xml><?xml version="1.0" encoding="utf-8"?>
+<p:sld xmlns:a="http://schemas.openxmlformats.org/drawingml/2006/main" xmlns:r="http://schemas.openxmlformats.org/officeDocument/2006/relationships" xmlns:p="http://schemas.openxmlformats.org/presentationml/2006/main">
+  <p:cSld>
+    <p:spTree>
+      <p:nvGrpSpPr>
+        <p:cNvPr id="1" name=""/>
+        <p:cNvGrpSpPr/>
+        <p:nvPr/>
+      </p:nvGrpSpPr>
+      <p:grpSpPr>
+        <a:xfrm>
+          <a:off x="0" y="0"/>
+          <a:ext cx="0" cy="0"/>
+          <a:chOff x="0" y="0"/>
+          <a:chExt cx="0" cy="0"/>
+        </a:xfrm>
+      </p:grpSpPr>
+      <p:sp>
+        <p:nvSpPr>
+          <p:cNvPr id="2" name="Title 1">
+            <a:extLst>
+              <a:ext uri="{FF2B5EF4-FFF2-40B4-BE49-F238E27FC236}">
+                <a16:creationId xmlns:a16="http://schemas.microsoft.com/office/drawing/2014/main" id="{3F961845-EC97-0315-5E8F-6C5D71DB6279}"/>
+              </a:ext>
+            </a:extLst>
+          </p:cNvPr>
+          <p:cNvSpPr>
+            <a:spLocks noGrp="1"/>
+          </p:cNvSpPr>
+          <p:nvPr>
+            <p:ph type="ctrTitle"/>
+          </p:nvPr>
+        </p:nvSpPr>
+        <p:spPr/>
+        <p:txBody>
+          <a:bodyPr/>
+          <a:lstStyle/>
+          <a:p>
+            <a:endParaRPr lang="en-US" dirty="0"/>
+          </a:p>
+        </p:txBody>
+      </p:sp>
+      <p:pic>
+        <p:nvPicPr>
+          <p:cNvPr id="6" name="Picture 5">
+            <a:extLst>
+              <a:ext uri="{FF2B5EF4-FFF2-40B4-BE49-F238E27FC236}">
+                <a16:creationId xmlns:a16="http://schemas.microsoft.com/office/drawing/2014/main" id="{D580AC16-58E7-9686-06C7-53DEDF6A3CB9}"/>
+              </a:ext>
+            </a:extLst>
+          </p:cNvPr>
+          <p:cNvPicPr>
+            <a:picLocks noChangeAspect="1"/>
+          </p:cNvPicPr>
+          <p:nvPr/>
+        </p:nvPicPr>
+        <p:blipFill>
+          <a:blip r:embed="rId2"/>
+          <a:stretch>
+            <a:fillRect/>
+          </a:stretch>
+        </p:blipFill>
+        <p:spPr>
+          <a:xfrm>
+            <a:off x="0" y="308638"/>
+            <a:ext cx="12192000" cy="6096000"/>
+          </a:xfrm>
+          <a:prstGeom prst="rect">
+            <a:avLst/>
+          </a:prstGeom>
+        </p:spPr>
+      </p:pic>
+    </p:spTree>
+    <p:extLst>
+      <p:ext uri="{BB962C8B-B14F-4D97-AF65-F5344CB8AC3E}">
+        <p14:creationId xmlns:p14="http://schemas.microsoft.com/office/powerpoint/2010/main" val="463700963"/>
+      </p:ext>
+    </p:extLst>
+  </p:cSld>
+  <p:clrMapOvr>
+    <a:masterClrMapping/>
+  </p:clrMapOvr>
+</p:sld>
+</file>
+
+<file path=ppt/slides/slide12.xml><?xml version="1.0" encoding="utf-8"?>
+<p:sld xmlns:a="http://schemas.openxmlformats.org/drawingml/2006/main" xmlns:r="http://schemas.openxmlformats.org/officeDocument/2006/relationships" xmlns:p="http://schemas.openxmlformats.org/presentationml/2006/main">
+  <p:cSld>
+    <p:spTree>
+      <p:nvGrpSpPr>
+        <p:cNvPr id="1" name=""/>
+        <p:cNvGrpSpPr/>
+        <p:nvPr/>
+      </p:nvGrpSpPr>
+      <p:grpSpPr>
+        <a:xfrm>
+          <a:off x="0" y="0"/>
+          <a:ext cx="0" cy="0"/>
+          <a:chOff x="0" y="0"/>
+          <a:chExt cx="0" cy="0"/>
+        </a:xfrm>
+      </p:grpSpPr>
+      <p:sp>
+        <p:nvSpPr>
+          <p:cNvPr id="2" name="Title 1">
+            <a:extLst>
+              <a:ext uri="{FF2B5EF4-FFF2-40B4-BE49-F238E27FC236}">
+                <a16:creationId xmlns:a16="http://schemas.microsoft.com/office/drawing/2014/main" id="{3F961845-EC97-0315-5E8F-6C5D71DB6279}"/>
+              </a:ext>
+            </a:extLst>
+          </p:cNvPr>
+          <p:cNvSpPr>
+            <a:spLocks noGrp="1"/>
+          </p:cNvSpPr>
+          <p:nvPr>
+            <p:ph type="ctrTitle"/>
+          </p:nvPr>
+        </p:nvSpPr>
+        <p:spPr/>
+        <p:txBody>
+          <a:bodyPr/>
+          <a:lstStyle/>
+          <a:p>
+            <a:endParaRPr lang="en-US" dirty="0"/>
+          </a:p>
+        </p:txBody>
+      </p:sp>
+      <p:pic>
+        <p:nvPicPr>
+          <p:cNvPr id="4" name="Picture 3">
+            <a:extLst>
+              <a:ext uri="{FF2B5EF4-FFF2-40B4-BE49-F238E27FC236}">
+                <a16:creationId xmlns:a16="http://schemas.microsoft.com/office/drawing/2014/main" id="{D03BD61A-011F-35F5-859A-BF5E09F41555}"/>
+              </a:ext>
+            </a:extLst>
+          </p:cNvPr>
+          <p:cNvPicPr>
+            <a:picLocks noChangeAspect="1"/>
+          </p:cNvPicPr>
+          <p:nvPr/>
+        </p:nvPicPr>
+        <p:blipFill>
+          <a:blip r:embed="rId2"/>
+          <a:stretch>
+            <a:fillRect/>
+          </a:stretch>
+        </p:blipFill>
+        <p:spPr>
+          <a:xfrm>
+            <a:off x="-76200" y="76200"/>
+            <a:ext cx="12192000" cy="6705600"/>
+          </a:xfrm>
+          <a:prstGeom prst="rect">
+            <a:avLst/>
+          </a:prstGeom>
+        </p:spPr>
+      </p:pic>
+    </p:spTree>
+    <p:extLst>
+      <p:ext uri="{BB962C8B-B14F-4D97-AF65-F5344CB8AC3E}">
+        <p14:creationId xmlns:p14="http://schemas.microsoft.com/office/powerpoint/2010/main" val="3037703762"/>
+      </p:ext>
+    </p:extLst>
+  </p:cSld>
+  <p:clrMapOvr>
+    <a:masterClrMapping/>
+  </p:clrMapOvr>
+</p:sld>
+</file>
+
+<file path=ppt/slides/slide13.xml><?xml version="1.0" encoding="utf-8"?>
+<p:sld xmlns:a="http://schemas.openxmlformats.org/drawingml/2006/main" xmlns:r="http://schemas.openxmlformats.org/officeDocument/2006/relationships" xmlns:p="http://schemas.openxmlformats.org/presentationml/2006/main">
+  <p:cSld>
+    <p:spTree>
+      <p:nvGrpSpPr>
+        <p:cNvPr id="1" name=""/>
+        <p:cNvGrpSpPr/>
+        <p:nvPr/>
+      </p:nvGrpSpPr>
+      <p:grpSpPr>
+        <a:xfrm>
+          <a:off x="0" y="0"/>
+          <a:ext cx="0" cy="0"/>
+          <a:chOff x="0" y="0"/>
+          <a:chExt cx="0" cy="0"/>
+        </a:xfrm>
+      </p:grpSpPr>
+      <p:sp>
+        <p:nvSpPr>
+          <p:cNvPr id="2" name="Title 1">
+            <a:extLst>
+              <a:ext uri="{FF2B5EF4-FFF2-40B4-BE49-F238E27FC236}">
+                <a16:creationId xmlns:a16="http://schemas.microsoft.com/office/drawing/2014/main" id="{3F961845-EC97-0315-5E8F-6C5D71DB6279}"/>
+              </a:ext>
+            </a:extLst>
+          </p:cNvPr>
+          <p:cNvSpPr>
+            <a:spLocks noGrp="1"/>
+          </p:cNvSpPr>
+          <p:nvPr>
+            <p:ph type="ctrTitle"/>
+          </p:nvPr>
+        </p:nvSpPr>
+        <p:spPr/>
+        <p:txBody>
+          <a:bodyPr/>
+          <a:lstStyle/>
+          <a:p>
+            <a:endParaRPr lang="en-US" dirty="0"/>
+          </a:p>
+        </p:txBody>
+      </p:sp>
+      <p:pic>
+        <p:nvPicPr>
+          <p:cNvPr id="6" name="Picture 5">
+            <a:extLst>
+              <a:ext uri="{FF2B5EF4-FFF2-40B4-BE49-F238E27FC236}">
+                <a16:creationId xmlns:a16="http://schemas.microsoft.com/office/drawing/2014/main" id="{77821578-13B2-38DD-B892-C6E8B8ACE5CD}"/>
+              </a:ext>
+            </a:extLst>
+          </p:cNvPr>
+          <p:cNvPicPr>
+            <a:picLocks noChangeAspect="1"/>
+          </p:cNvPicPr>
+          <p:nvPr/>
+        </p:nvPicPr>
+        <p:blipFill>
+          <a:blip r:embed="rId2"/>
+          <a:stretch>
+            <a:fillRect/>
+          </a:stretch>
+        </p:blipFill>
+        <p:spPr>
+          <a:xfrm>
+            <a:off x="76200" y="990600"/>
+            <a:ext cx="12192000" cy="4876800"/>
+          </a:xfrm>
+          <a:prstGeom prst="rect">
+            <a:avLst/>
+          </a:prstGeom>
+        </p:spPr>
+      </p:pic>
+      <p:pic>
+        <p:nvPicPr>
+          <p:cNvPr id="4" name="Picture 3">
+            <a:extLst>
+              <a:ext uri="{FF2B5EF4-FFF2-40B4-BE49-F238E27FC236}">
+                <a16:creationId xmlns:a16="http://schemas.microsoft.com/office/drawing/2014/main" id="{AA60B8EB-EC10-5FBD-DA19-D097CE0CD045}"/>
+              </a:ext>
+            </a:extLst>
+          </p:cNvPr>
+          <p:cNvPicPr>
+            <a:picLocks noChangeAspect="1"/>
+          </p:cNvPicPr>
+          <p:nvPr/>
+        </p:nvPicPr>
+        <p:blipFill>
+          <a:blip r:embed="rId3"/>
+          <a:stretch>
+            <a:fillRect/>
+          </a:stretch>
+        </p:blipFill>
+        <p:spPr>
+          <a:xfrm>
+            <a:off x="-76200" y="382549"/>
+            <a:ext cx="12192000" cy="4689231"/>
+          </a:xfrm>
+          <a:prstGeom prst="rect">
+            <a:avLst/>
+          </a:prstGeom>
+        </p:spPr>
+      </p:pic>
+    </p:spTree>
+    <p:extLst>
+      <p:ext uri="{BB962C8B-B14F-4D97-AF65-F5344CB8AC3E}">
+        <p14:creationId xmlns:p14="http://schemas.microsoft.com/office/powerpoint/2010/main" val="857292706"/>
+      </p:ext>
+    </p:extLst>
+  </p:cSld>
+  <p:clrMapOvr>
+    <a:masterClrMapping/>
+  </p:clrMapOvr>
+</p:sld>
+</file>
+
+<file path=ppt/slides/slide14.xml><?xml version="1.0" encoding="utf-8"?>
+<p:sld xmlns:a="http://schemas.openxmlformats.org/drawingml/2006/main" xmlns:r="http://schemas.openxmlformats.org/officeDocument/2006/relationships" xmlns:p="http://schemas.openxmlformats.org/presentationml/2006/main">
+  <p:cSld>
+    <p:spTree>
+      <p:nvGrpSpPr>
+        <p:cNvPr id="1" name=""/>
+        <p:cNvGrpSpPr/>
+        <p:nvPr/>
+      </p:nvGrpSpPr>
+      <p:grpSpPr>
+        <a:xfrm>
+          <a:off x="0" y="0"/>
+          <a:ext cx="0" cy="0"/>
+          <a:chOff x="0" y="0"/>
+          <a:chExt cx="0" cy="0"/>
+        </a:xfrm>
+      </p:grpSpPr>
+      <p:sp>
+        <p:nvSpPr>
+          <p:cNvPr id="2" name="Title 1">
+            <a:extLst>
+              <a:ext uri="{FF2B5EF4-FFF2-40B4-BE49-F238E27FC236}">
+                <a16:creationId xmlns:a16="http://schemas.microsoft.com/office/drawing/2014/main" id="{3F961845-EC97-0315-5E8F-6C5D71DB6279}"/>
+              </a:ext>
+            </a:extLst>
+          </p:cNvPr>
+          <p:cNvSpPr>
+            <a:spLocks noGrp="1"/>
+          </p:cNvSpPr>
+          <p:nvPr>
+            <p:ph type="ctrTitle"/>
+          </p:nvPr>
+        </p:nvSpPr>
+        <p:spPr/>
+        <p:txBody>
+          <a:bodyPr/>
+          <a:lstStyle/>
+          <a:p>
+            <a:endParaRPr lang="en-US" dirty="0"/>
+          </a:p>
+        </p:txBody>
+      </p:sp>
+      <p:pic>
+        <p:nvPicPr>
+          <p:cNvPr id="4" name="Picture 3">
+            <a:extLst>
+              <a:ext uri="{FF2B5EF4-FFF2-40B4-BE49-F238E27FC236}">
+                <a16:creationId xmlns:a16="http://schemas.microsoft.com/office/drawing/2014/main" id="{A12B3A55-78A1-47BB-3D1E-78F2F1D73113}"/>
+              </a:ext>
+            </a:extLst>
+          </p:cNvPr>
+          <p:cNvPicPr>
+            <a:picLocks noChangeAspect="1"/>
+          </p:cNvPicPr>
+          <p:nvPr/>
+        </p:nvPicPr>
+        <p:blipFill>
+          <a:blip r:embed="rId2"/>
+          <a:stretch>
+            <a:fillRect/>
+          </a:stretch>
+        </p:blipFill>
+        <p:spPr>
+          <a:xfrm>
+            <a:off x="0" y="76200"/>
+            <a:ext cx="12192000" cy="6705600"/>
+          </a:xfrm>
+          <a:prstGeom prst="rect">
+            <a:avLst/>
+          </a:prstGeom>
+        </p:spPr>
+      </p:pic>
+      <p:pic>
+        <p:nvPicPr>
+          <p:cNvPr id="5" name="Picture 4">
+            <a:extLst>
+              <a:ext uri="{FF2B5EF4-FFF2-40B4-BE49-F238E27FC236}">
+                <a16:creationId xmlns:a16="http://schemas.microsoft.com/office/drawing/2014/main" id="{41AF5543-AFE9-39AA-794D-EAC7539008F9}"/>
+              </a:ext>
+            </a:extLst>
+          </p:cNvPr>
+          <p:cNvPicPr>
+            <a:picLocks noChangeAspect="1"/>
+          </p:cNvPicPr>
+          <p:nvPr/>
+        </p:nvPicPr>
+        <p:blipFill>
+          <a:blip r:embed="rId2"/>
+          <a:stretch>
+            <a:fillRect/>
+          </a:stretch>
+        </p:blipFill>
+        <p:spPr>
+          <a:xfrm>
+            <a:off x="-52628" y="152400"/>
+            <a:ext cx="12192000" cy="6705600"/>
+          </a:xfrm>
+          <a:prstGeom prst="rect">
+            <a:avLst/>
+          </a:prstGeom>
+        </p:spPr>
+      </p:pic>
+    </p:spTree>
+    <p:extLst>
+      <p:ext uri="{BB962C8B-B14F-4D97-AF65-F5344CB8AC3E}">
+        <p14:creationId xmlns:p14="http://schemas.microsoft.com/office/powerpoint/2010/main" val="2685783913"/>
+      </p:ext>
+    </p:extLst>
+  </p:cSld>
+  <p:clrMapOvr>
+    <a:masterClrMapping/>
+  </p:clrMapOvr>
+</p:sld>
+</file>
+
+<file path=ppt/slides/slide15.xml><?xml version="1.0" encoding="utf-8"?>
+<p:sld xmlns:a="http://schemas.openxmlformats.org/drawingml/2006/main" xmlns:r="http://schemas.openxmlformats.org/officeDocument/2006/relationships" xmlns:p="http://schemas.openxmlformats.org/presentationml/2006/main">
+  <p:cSld>
+    <p:spTree>
+      <p:nvGrpSpPr>
+        <p:cNvPr id="1" name=""/>
+        <p:cNvGrpSpPr/>
+        <p:nvPr/>
+      </p:nvGrpSpPr>
+      <p:grpSpPr>
+        <a:xfrm>
+          <a:off x="0" y="0"/>
+          <a:ext cx="0" cy="0"/>
+          <a:chOff x="0" y="0"/>
+          <a:chExt cx="0" cy="0"/>
+        </a:xfrm>
+      </p:grpSpPr>
+      <p:sp>
+        <p:nvSpPr>
+          <p:cNvPr id="2" name="Title 1">
+            <a:extLst>
+              <a:ext uri="{FF2B5EF4-FFF2-40B4-BE49-F238E27FC236}">
+                <a16:creationId xmlns:a16="http://schemas.microsoft.com/office/drawing/2014/main" id="{3F961845-EC97-0315-5E8F-6C5D71DB6279}"/>
+              </a:ext>
+            </a:extLst>
+          </p:cNvPr>
+          <p:cNvSpPr>
+            <a:spLocks noGrp="1"/>
+          </p:cNvSpPr>
+          <p:nvPr>
+            <p:ph type="ctrTitle"/>
+          </p:nvPr>
+        </p:nvSpPr>
+        <p:spPr/>
+        <p:txBody>
+          <a:bodyPr/>
+          <a:lstStyle/>
+          <a:p>
+            <a:endParaRPr lang="en-US" dirty="0"/>
+          </a:p>
+        </p:txBody>
+      </p:sp>
+      <p:pic>
+        <p:nvPicPr>
+          <p:cNvPr id="6" name="Picture 5">
+            <a:extLst>
+              <a:ext uri="{FF2B5EF4-FFF2-40B4-BE49-F238E27FC236}">
+                <a16:creationId xmlns:a16="http://schemas.microsoft.com/office/drawing/2014/main" id="{9F5C5984-6B4F-43AF-7E34-2E2F47D50CA8}"/>
+              </a:ext>
+            </a:extLst>
+          </p:cNvPr>
+          <p:cNvPicPr>
+            <a:picLocks noChangeAspect="1"/>
+          </p:cNvPicPr>
+          <p:nvPr/>
+        </p:nvPicPr>
+        <p:blipFill>
+          <a:blip r:embed="rId2"/>
+          <a:stretch>
+            <a:fillRect/>
+          </a:stretch>
+        </p:blipFill>
+        <p:spPr>
+          <a:xfrm>
+            <a:off x="91440" y="990600"/>
+            <a:ext cx="12192000" cy="4876800"/>
+          </a:xfrm>
+          <a:prstGeom prst="rect">
+            <a:avLst/>
+          </a:prstGeom>
+        </p:spPr>
+      </p:pic>
+    </p:spTree>
+    <p:extLst>
+      <p:ext uri="{BB962C8B-B14F-4D97-AF65-F5344CB8AC3E}">
+        <p14:creationId xmlns:p14="http://schemas.microsoft.com/office/powerpoint/2010/main" val="863612797"/>
+      </p:ext>
+    </p:extLst>
+  </p:cSld>
+  <p:clrMapOvr>
+    <a:masterClrMapping/>
+  </p:clrMapOvr>
+</p:sld>
+</file>
+
+<file path=ppt/slides/slide16.xml><?xml version="1.0" encoding="utf-8"?>
+<p:sld xmlns:a="http://schemas.openxmlformats.org/drawingml/2006/main" xmlns:r="http://schemas.openxmlformats.org/officeDocument/2006/relationships" xmlns:p="http://schemas.openxmlformats.org/presentationml/2006/main">
+  <p:cSld>
+    <p:spTree>
+      <p:nvGrpSpPr>
+        <p:cNvPr id="1" name=""/>
+        <p:cNvGrpSpPr/>
+        <p:nvPr/>
+      </p:nvGrpSpPr>
+      <p:grpSpPr>
+        <a:xfrm>
+          <a:off x="0" y="0"/>
+          <a:ext cx="0" cy="0"/>
+          <a:chOff x="0" y="0"/>
+          <a:chExt cx="0" cy="0"/>
+        </a:xfrm>
+      </p:grpSpPr>
+      <p:pic>
+        <p:nvPicPr>
+          <p:cNvPr id="5" name="Picture 4">
+            <a:extLst>
+              <a:ext uri="{FF2B5EF4-FFF2-40B4-BE49-F238E27FC236}">
+                <a16:creationId xmlns:a16="http://schemas.microsoft.com/office/drawing/2014/main" id="{FFEB9850-8F5D-51F7-1D2D-DF2F77242BF6}"/>
+              </a:ext>
+            </a:extLst>
+          </p:cNvPr>
+          <p:cNvPicPr>
+            <a:picLocks noChangeAspect="1"/>
+          </p:cNvPicPr>
+          <p:nvPr/>
+        </p:nvPicPr>
+        <p:blipFill>
+          <a:blip r:embed="rId2"/>
+          <a:stretch>
+            <a:fillRect/>
+          </a:stretch>
+        </p:blipFill>
+        <p:spPr>
+          <a:xfrm>
+            <a:off x="374650" y="525584"/>
+            <a:ext cx="12192000" cy="4689231"/>
+          </a:xfrm>
+          <a:prstGeom prst="rect">
+            <a:avLst/>
+          </a:prstGeom>
+        </p:spPr>
+      </p:pic>
+    </p:spTree>
+    <p:extLst>
+      <p:ext uri="{BB962C8B-B14F-4D97-AF65-F5344CB8AC3E}">
+        <p14:creationId xmlns:p14="http://schemas.microsoft.com/office/powerpoint/2010/main" val="3881242898"/>
+      </p:ext>
+    </p:extLst>
+  </p:cSld>
+  <p:clrMapOvr>
+    <a:masterClrMapping/>
+  </p:clrMapOvr>
+</p:sld>
+</file>
+
+<file path=ppt/slides/slide17.xml><?xml version="1.0" encoding="utf-8"?>
+<p:sld xmlns:a="http://schemas.openxmlformats.org/drawingml/2006/main" xmlns:r="http://schemas.openxmlformats.org/officeDocument/2006/relationships" xmlns:p="http://schemas.openxmlformats.org/presentationml/2006/main">
+  <p:cSld>
+    <p:spTree>
+      <p:nvGrpSpPr>
+        <p:cNvPr id="1" name=""/>
+        <p:cNvGrpSpPr/>
+        <p:nvPr/>
+      </p:nvGrpSpPr>
+      <p:grpSpPr>
+        <a:xfrm>
+          <a:off x="0" y="0"/>
+          <a:ext cx="0" cy="0"/>
+          <a:chOff x="0" y="0"/>
+          <a:chExt cx="0" cy="0"/>
+        </a:xfrm>
+      </p:grpSpPr>
+      <p:sp>
+        <p:nvSpPr>
+          <p:cNvPr id="2" name="Title 1">
+            <a:extLst>
+              <a:ext uri="{FF2B5EF4-FFF2-40B4-BE49-F238E27FC236}">
+                <a16:creationId xmlns:a16="http://schemas.microsoft.com/office/drawing/2014/main" id="{A1B1AA45-FB3F-B6A8-47A2-A6B5DE36F78D}"/>
+              </a:ext>
+            </a:extLst>
+          </p:cNvPr>
+          <p:cNvSpPr>
+            <a:spLocks noGrp="1"/>
+          </p:cNvSpPr>
+          <p:nvPr>
+            <p:ph type="title"/>
+          </p:nvPr>
+        </p:nvSpPr>
+        <p:spPr>
+          <a:xfrm>
+            <a:off x="508000" y="126266"/>
+            <a:ext cx="10515600" cy="1325563"/>
+          </a:xfrm>
+        </p:spPr>
+        <p:txBody>
+          <a:bodyPr/>
+          <a:lstStyle/>
+          <a:p>
+            <a:r>
+              <a:rPr lang="en-US" dirty="0"/>
+              <a:t>GPT 3.5</a:t>
+            </a:r>
+          </a:p>
+        </p:txBody>
+      </p:sp>
+      <p:sp>
+        <p:nvSpPr>
+          <p:cNvPr id="3" name="Content Placeholder 2">
+            <a:extLst>
+              <a:ext uri="{FF2B5EF4-FFF2-40B4-BE49-F238E27FC236}">
+                <a16:creationId xmlns:a16="http://schemas.microsoft.com/office/drawing/2014/main" id="{C8FA47F5-786F-BDBC-70CA-4E31EAEDD64C}"/>
+              </a:ext>
+            </a:extLst>
+          </p:cNvPr>
+          <p:cNvSpPr>
+            <a:spLocks noGrp="1"/>
+          </p:cNvSpPr>
+          <p:nvPr>
+            <p:ph idx="1"/>
+          </p:nvPr>
+        </p:nvSpPr>
+        <p:spPr/>
+        <p:txBody>
+          <a:bodyPr/>
+          <a:lstStyle/>
+          <a:p>
+            <a:endParaRPr lang="en-US"/>
+          </a:p>
+        </p:txBody>
+      </p:sp>
+      <p:pic>
+        <p:nvPicPr>
+          <p:cNvPr id="9" name="Picture 8">
+            <a:extLst>
+              <a:ext uri="{FF2B5EF4-FFF2-40B4-BE49-F238E27FC236}">
+                <a16:creationId xmlns:a16="http://schemas.microsoft.com/office/drawing/2014/main" id="{3A3E628B-CF50-DEDA-1CF4-3D0E247D8E31}"/>
+              </a:ext>
+            </a:extLst>
+          </p:cNvPr>
+          <p:cNvPicPr>
+            <a:picLocks noChangeAspect="1"/>
+          </p:cNvPicPr>
+          <p:nvPr/>
+        </p:nvPicPr>
+        <p:blipFill>
+          <a:blip r:embed="rId2"/>
+          <a:stretch>
+            <a:fillRect/>
+          </a:stretch>
+        </p:blipFill>
+        <p:spPr>
+          <a:xfrm>
+            <a:off x="0" y="1078034"/>
+            <a:ext cx="12192000" cy="4689231"/>
+          </a:xfrm>
+          <a:prstGeom prst="rect">
+            <a:avLst/>
+          </a:prstGeom>
+        </p:spPr>
+      </p:pic>
+    </p:spTree>
+    <p:extLst>
+      <p:ext uri="{BB962C8B-B14F-4D97-AF65-F5344CB8AC3E}">
+        <p14:creationId xmlns:p14="http://schemas.microsoft.com/office/powerpoint/2010/main" val="4274363273"/>
+      </p:ext>
+    </p:extLst>
+  </p:cSld>
+  <p:clrMapOvr>
+    <a:masterClrMapping/>
+  </p:clrMapOvr>
+</p:sld>
+</file>
+
+<file path=ppt/slides/slide18.xml><?xml version="1.0" encoding="utf-8"?>
+<p:sld xmlns:a="http://schemas.openxmlformats.org/drawingml/2006/main" xmlns:r="http://schemas.openxmlformats.org/officeDocument/2006/relationships" xmlns:p="http://schemas.openxmlformats.org/presentationml/2006/main">
+  <p:cSld>
+    <p:spTree>
+      <p:nvGrpSpPr>
+        <p:cNvPr id="1" name=""/>
+        <p:cNvGrpSpPr/>
+        <p:nvPr/>
+      </p:nvGrpSpPr>
+      <p:grpSpPr>
+        <a:xfrm>
+          <a:off x="0" y="0"/>
+          <a:ext cx="0" cy="0"/>
+          <a:chOff x="0" y="0"/>
+          <a:chExt cx="0" cy="0"/>
+        </a:xfrm>
+      </p:grpSpPr>
+      <p:sp>
+        <p:nvSpPr>
+          <p:cNvPr id="2" name="Title 1">
+            <a:extLst>
+              <a:ext uri="{FF2B5EF4-FFF2-40B4-BE49-F238E27FC236}">
+                <a16:creationId xmlns:a16="http://schemas.microsoft.com/office/drawing/2014/main" id="{A1B1AA45-FB3F-B6A8-47A2-A6B5DE36F78D}"/>
+              </a:ext>
+            </a:extLst>
+          </p:cNvPr>
+          <p:cNvSpPr>
+            <a:spLocks noGrp="1"/>
+          </p:cNvSpPr>
+          <p:nvPr>
+            <p:ph type="title"/>
+          </p:nvPr>
+        </p:nvSpPr>
+        <p:spPr>
+          <a:xfrm>
+            <a:off x="508000" y="126266"/>
+            <a:ext cx="10515600" cy="1325563"/>
+          </a:xfrm>
+        </p:spPr>
+        <p:txBody>
+          <a:bodyPr/>
+          <a:lstStyle/>
+          <a:p>
+            <a:r>
+              <a:rPr lang="en-US" dirty="0"/>
+              <a:t>GPT 4 - 0125</a:t>
+            </a:r>
+          </a:p>
+        </p:txBody>
+      </p:sp>
+      <p:sp>
+        <p:nvSpPr>
+          <p:cNvPr id="3" name="Content Placeholder 2">
+            <a:extLst>
+              <a:ext uri="{FF2B5EF4-FFF2-40B4-BE49-F238E27FC236}">
+                <a16:creationId xmlns:a16="http://schemas.microsoft.com/office/drawing/2014/main" id="{C8FA47F5-786F-BDBC-70CA-4E31EAEDD64C}"/>
+              </a:ext>
+            </a:extLst>
+          </p:cNvPr>
+          <p:cNvSpPr>
+            <a:spLocks noGrp="1"/>
+          </p:cNvSpPr>
+          <p:nvPr>
+            <p:ph idx="1"/>
+          </p:nvPr>
+        </p:nvSpPr>
+        <p:spPr/>
+        <p:txBody>
+          <a:bodyPr/>
+          <a:lstStyle/>
+          <a:p>
+            <a:endParaRPr lang="en-US"/>
+          </a:p>
+        </p:txBody>
+      </p:sp>
+      <p:pic>
+        <p:nvPicPr>
+          <p:cNvPr id="5" name="Picture 4">
+            <a:extLst>
+              <a:ext uri="{FF2B5EF4-FFF2-40B4-BE49-F238E27FC236}">
+                <a16:creationId xmlns:a16="http://schemas.microsoft.com/office/drawing/2014/main" id="{E991D8B8-B48D-3996-E8B6-90847EA6F7C4}"/>
+              </a:ext>
+            </a:extLst>
+          </p:cNvPr>
+          <p:cNvPicPr>
+            <a:picLocks noChangeAspect="1"/>
+          </p:cNvPicPr>
+          <p:nvPr/>
+        </p:nvPicPr>
+        <p:blipFill>
+          <a:blip r:embed="rId2"/>
+          <a:stretch>
+            <a:fillRect/>
+          </a:stretch>
+        </p:blipFill>
+        <p:spPr>
+          <a:xfrm>
+            <a:off x="57150" y="1084384"/>
+            <a:ext cx="12192000" cy="4689231"/>
+          </a:xfrm>
+          <a:prstGeom prst="rect">
+            <a:avLst/>
+          </a:prstGeom>
+        </p:spPr>
+      </p:pic>
+    </p:spTree>
+    <p:extLst>
+      <p:ext uri="{BB962C8B-B14F-4D97-AF65-F5344CB8AC3E}">
+        <p14:creationId xmlns:p14="http://schemas.microsoft.com/office/powerpoint/2010/main" val="3848664348"/>
+      </p:ext>
+    </p:extLst>
+  </p:cSld>
+  <p:clrMapOvr>
+    <a:masterClrMapping/>
+  </p:clrMapOvr>
+</p:sld>
+</file>
+
+<file path=ppt/slides/slide19.xml><?xml version="1.0" encoding="utf-8"?>
+<p:sld xmlns:a="http://schemas.openxmlformats.org/drawingml/2006/main" xmlns:r="http://schemas.openxmlformats.org/officeDocument/2006/relationships" xmlns:p="http://schemas.openxmlformats.org/presentationml/2006/main">
+  <p:cSld>
+    <p:spTree>
+      <p:nvGrpSpPr>
+        <p:cNvPr id="1" name=""/>
+        <p:cNvGrpSpPr/>
+        <p:nvPr/>
+      </p:nvGrpSpPr>
+      <p:grpSpPr>
+        <a:xfrm>
+          <a:off x="0" y="0"/>
+          <a:ext cx="0" cy="0"/>
+          <a:chOff x="0" y="0"/>
+          <a:chExt cx="0" cy="0"/>
+        </a:xfrm>
+      </p:grpSpPr>
+      <p:sp>
+        <p:nvSpPr>
+          <p:cNvPr id="2" name="Title 1">
+            <a:extLst>
+              <a:ext uri="{FF2B5EF4-FFF2-40B4-BE49-F238E27FC236}">
+                <a16:creationId xmlns:a16="http://schemas.microsoft.com/office/drawing/2014/main" id="{A1B1AA45-FB3F-B6A8-47A2-A6B5DE36F78D}"/>
+              </a:ext>
+            </a:extLst>
+          </p:cNvPr>
+          <p:cNvSpPr>
+            <a:spLocks noGrp="1"/>
+          </p:cNvSpPr>
+          <p:nvPr>
+            <p:ph type="title"/>
+          </p:nvPr>
+        </p:nvSpPr>
+        <p:spPr>
+          <a:xfrm>
+            <a:off x="508000" y="126266"/>
+            <a:ext cx="10515600" cy="1325563"/>
+          </a:xfrm>
+        </p:spPr>
+        <p:txBody>
+          <a:bodyPr/>
+          <a:lstStyle/>
+          <a:p>
+            <a:r>
+              <a:rPr lang="en-US" dirty="0"/>
+              <a:t>GPT 4 - 0125</a:t>
+            </a:r>
+          </a:p>
+        </p:txBody>
+      </p:sp>
+      <p:sp>
+        <p:nvSpPr>
+          <p:cNvPr id="3" name="Content Placeholder 2">
+            <a:extLst>
+              <a:ext uri="{FF2B5EF4-FFF2-40B4-BE49-F238E27FC236}">
+                <a16:creationId xmlns:a16="http://schemas.microsoft.com/office/drawing/2014/main" id="{C8FA47F5-786F-BDBC-70CA-4E31EAEDD64C}"/>
+              </a:ext>
+            </a:extLst>
+          </p:cNvPr>
+          <p:cNvSpPr>
+            <a:spLocks noGrp="1"/>
+          </p:cNvSpPr>
+          <p:nvPr>
+            <p:ph idx="1"/>
+          </p:nvPr>
+        </p:nvSpPr>
+        <p:spPr/>
+        <p:txBody>
+          <a:bodyPr/>
+          <a:lstStyle/>
+          <a:p>
+            <a:endParaRPr lang="en-US"/>
+          </a:p>
+        </p:txBody>
+      </p:sp>
+      <p:pic>
+        <p:nvPicPr>
+          <p:cNvPr id="6" name="Picture 5">
+            <a:extLst>
+              <a:ext uri="{FF2B5EF4-FFF2-40B4-BE49-F238E27FC236}">
+                <a16:creationId xmlns:a16="http://schemas.microsoft.com/office/drawing/2014/main" id="{C7E6BC35-8689-922F-CE74-0EC35C8A6202}"/>
+              </a:ext>
+            </a:extLst>
+          </p:cNvPr>
+          <p:cNvPicPr>
+            <a:picLocks noChangeAspect="1"/>
+          </p:cNvPicPr>
+          <p:nvPr/>
+        </p:nvPicPr>
+        <p:blipFill>
+          <a:blip r:embed="rId2"/>
+          <a:stretch>
+            <a:fillRect/>
+          </a:stretch>
+        </p:blipFill>
+        <p:spPr>
+          <a:xfrm>
+            <a:off x="0" y="1274884"/>
+            <a:ext cx="12192000" cy="4689231"/>
+          </a:xfrm>
+          <a:prstGeom prst="rect">
+            <a:avLst/>
+          </a:prstGeom>
+        </p:spPr>
+      </p:pic>
+    </p:spTree>
+    <p:extLst>
+      <p:ext uri="{BB962C8B-B14F-4D97-AF65-F5344CB8AC3E}">
+        <p14:creationId xmlns:p14="http://schemas.microsoft.com/office/powerpoint/2010/main" val="3727815983"/>
+      </p:ext>
+    </p:extLst>
+  </p:cSld>
+  <p:clrMapOvr>
+    <a:masterClrMapping/>
+  </p:clrMapOvr>
+</p:sld>
+</file>
+
+<file path=ppt/slides/slide2.xml><?xml version="1.0" encoding="utf-8"?>
+<p:sld xmlns:a="http://schemas.openxmlformats.org/drawingml/2006/main" xmlns:r="http://schemas.openxmlformats.org/officeDocument/2006/relationships" xmlns:p="http://schemas.openxmlformats.org/presentationml/2006/main">
+  <p:cSld>
+    <p:spTree>
+      <p:nvGrpSpPr>
+        <p:cNvPr id="1" name=""/>
+        <p:cNvGrpSpPr/>
+        <p:nvPr/>
+      </p:nvGrpSpPr>
+      <p:grpSpPr>
+        <a:xfrm>
+          <a:off x="0" y="0"/>
+          <a:ext cx="0" cy="0"/>
+          <a:chOff x="0" y="0"/>
+          <a:chExt cx="0" cy="0"/>
+        </a:xfrm>
+      </p:grpSpPr>
+      <p:sp>
+        <p:nvSpPr>
+          <p:cNvPr id="2" name="Title 1">
+            <a:extLst>
+              <a:ext uri="{FF2B5EF4-FFF2-40B4-BE49-F238E27FC236}">
+                <a16:creationId xmlns:a16="http://schemas.microsoft.com/office/drawing/2014/main" id="{3F961845-EC97-0315-5E8F-6C5D71DB6279}"/>
+              </a:ext>
+            </a:extLst>
+          </p:cNvPr>
+          <p:cNvSpPr>
+            <a:spLocks noGrp="1"/>
+          </p:cNvSpPr>
+          <p:nvPr>
+            <p:ph type="ctrTitle"/>
+          </p:nvPr>
+        </p:nvSpPr>
+        <p:spPr/>
+        <p:txBody>
+          <a:bodyPr/>
+          <a:lstStyle/>
+          <a:p>
+            <a:endParaRPr lang="en-US"/>
+          </a:p>
+        </p:txBody>
+      </p:sp>
+      <p:sp>
+        <p:nvSpPr>
+          <p:cNvPr id="3" name="Subtitle 2">
+            <a:extLst>
+              <a:ext uri="{FF2B5EF4-FFF2-40B4-BE49-F238E27FC236}">
+                <a16:creationId xmlns:a16="http://schemas.microsoft.com/office/drawing/2014/main" id="{B8070454-2168-6B1A-12BC-AAFCB09207F9}"/>
+              </a:ext>
+            </a:extLst>
+          </p:cNvPr>
+          <p:cNvSpPr>
+            <a:spLocks noGrp="1"/>
+          </p:cNvSpPr>
+          <p:nvPr>
+            <p:ph type="subTitle" idx="1"/>
+          </p:nvPr>
+        </p:nvSpPr>
+        <p:spPr>
+          <a:xfrm>
+            <a:off x="1410111" y="5202238"/>
+            <a:ext cx="9144000" cy="1655762"/>
+          </a:xfrm>
+        </p:spPr>
+        <p:txBody>
+          <a:bodyPr/>
+          <a:lstStyle/>
+          <a:p>
+            <a:r>
+              <a:rPr lang="en-US" dirty="0"/>
+              <a:t>N-BEATS RMSE: 28.960128784179688</a:t>
+            </a:r>
+          </a:p>
+          <a:p>
+            <a:r>
+              <a:rPr lang="en-US" dirty="0"/>
+              <a:t>N-HITS RMSE: 41.29133224487305</a:t>
+            </a:r>
+          </a:p>
+        </p:txBody>
+      </p:sp>
+      <p:pic>
+        <p:nvPicPr>
+          <p:cNvPr id="6" name="Picture 5">
+            <a:extLst>
+              <a:ext uri="{FF2B5EF4-FFF2-40B4-BE49-F238E27FC236}">
+                <a16:creationId xmlns:a16="http://schemas.microsoft.com/office/drawing/2014/main" id="{985C392A-F791-8268-B9DE-EF4BD1953AB4}"/>
+              </a:ext>
+            </a:extLst>
+          </p:cNvPr>
+          <p:cNvPicPr>
+            <a:picLocks noChangeAspect="1"/>
+          </p:cNvPicPr>
+          <p:nvPr/>
+        </p:nvPicPr>
+        <p:blipFill>
+          <a:blip r:embed="rId2"/>
+          <a:stretch>
+            <a:fillRect/>
+          </a:stretch>
+        </p:blipFill>
+        <p:spPr>
+          <a:xfrm>
+            <a:off x="52626" y="602668"/>
+            <a:ext cx="12192000" cy="4267200"/>
+          </a:xfrm>
+          <a:prstGeom prst="rect">
+            <a:avLst/>
+          </a:prstGeom>
+        </p:spPr>
+      </p:pic>
+    </p:spTree>
+    <p:extLst>
+      <p:ext uri="{BB962C8B-B14F-4D97-AF65-F5344CB8AC3E}">
+        <p14:creationId xmlns:p14="http://schemas.microsoft.com/office/powerpoint/2010/main" val="946708803"/>
+      </p:ext>
+    </p:extLst>
+  </p:cSld>
+  <p:clrMapOvr>
+    <a:masterClrMapping/>
+  </p:clrMapOvr>
+</p:sld>
+</file>
+
+<file path=ppt/slides/slide20.xml><?xml version="1.0" encoding="utf-8"?>
+<p:sld xmlns:a="http://schemas.openxmlformats.org/drawingml/2006/main" xmlns:r="http://schemas.openxmlformats.org/officeDocument/2006/relationships" xmlns:p="http://schemas.openxmlformats.org/presentationml/2006/main">
+  <p:cSld>
+    <p:spTree>
+      <p:nvGrpSpPr>
+        <p:cNvPr id="1" name=""/>
+        <p:cNvGrpSpPr/>
+        <p:nvPr/>
+      </p:nvGrpSpPr>
+      <p:grpSpPr>
+        <a:xfrm>
+          <a:off x="0" y="0"/>
+          <a:ext cx="0" cy="0"/>
+          <a:chOff x="0" y="0"/>
+          <a:chExt cx="0" cy="0"/>
+        </a:xfrm>
+      </p:grpSpPr>
+      <p:pic>
+        <p:nvPicPr>
+          <p:cNvPr id="8" name="Picture 7">
+            <a:extLst>
+              <a:ext uri="{FF2B5EF4-FFF2-40B4-BE49-F238E27FC236}">
+                <a16:creationId xmlns:a16="http://schemas.microsoft.com/office/drawing/2014/main" id="{0210EB28-C203-007E-B589-AEABF10064A8}"/>
+              </a:ext>
+            </a:extLst>
+          </p:cNvPr>
+          <p:cNvPicPr>
+            <a:picLocks noChangeAspect="1"/>
+          </p:cNvPicPr>
+          <p:nvPr/>
+        </p:nvPicPr>
+        <p:blipFill>
+          <a:blip r:embed="rId2"/>
+          <a:stretch>
+            <a:fillRect/>
+          </a:stretch>
+        </p:blipFill>
+        <p:spPr>
+          <a:xfrm>
+            <a:off x="0" y="1084384"/>
+            <a:ext cx="12192000" cy="4689231"/>
+          </a:xfrm>
+          <a:prstGeom prst="rect">
+            <a:avLst/>
+          </a:prstGeom>
+        </p:spPr>
+      </p:pic>
+    </p:spTree>
+    <p:extLst>
+      <p:ext uri="{BB962C8B-B14F-4D97-AF65-F5344CB8AC3E}">
+        <p14:creationId xmlns:p14="http://schemas.microsoft.com/office/powerpoint/2010/main" val="271433847"/>
+      </p:ext>
+    </p:extLst>
+  </p:cSld>
+  <p:clrMapOvr>
+    <a:masterClrMapping/>
+  </p:clrMapOvr>
+</p:sld>
+</file>
+
+<file path=ppt/slides/slide21.xml><?xml version="1.0" encoding="utf-8"?>
+<p:sld xmlns:a="http://schemas.openxmlformats.org/drawingml/2006/main" xmlns:r="http://schemas.openxmlformats.org/officeDocument/2006/relationships" xmlns:p="http://schemas.openxmlformats.org/presentationml/2006/main">
+  <p:cSld>
+    <p:spTree>
+      <p:nvGrpSpPr>
+        <p:cNvPr id="1" name=""/>
+        <p:cNvGrpSpPr/>
+        <p:nvPr/>
+      </p:nvGrpSpPr>
+      <p:grpSpPr>
+        <a:xfrm>
+          <a:off x="0" y="0"/>
+          <a:ext cx="0" cy="0"/>
+          <a:chOff x="0" y="0"/>
+          <a:chExt cx="0" cy="0"/>
+        </a:xfrm>
+      </p:grpSpPr>
+      <p:sp>
+        <p:nvSpPr>
+          <p:cNvPr id="5" name="Title 4">
+            <a:extLst>
+              <a:ext uri="{FF2B5EF4-FFF2-40B4-BE49-F238E27FC236}">
+                <a16:creationId xmlns:a16="http://schemas.microsoft.com/office/drawing/2014/main" id="{6A2A3DE5-ABA5-307F-2DB3-0295F62C7449}"/>
+              </a:ext>
+            </a:extLst>
+          </p:cNvPr>
+          <p:cNvSpPr>
+            <a:spLocks noGrp="1"/>
+          </p:cNvSpPr>
+          <p:nvPr>
+            <p:ph type="title"/>
+          </p:nvPr>
+        </p:nvSpPr>
+        <p:spPr/>
+        <p:txBody>
+          <a:bodyPr/>
+          <a:lstStyle/>
+          <a:p>
+            <a:endParaRPr lang="en-US"/>
+          </a:p>
+        </p:txBody>
+      </p:sp>
+      <p:sp>
+        <p:nvSpPr>
+          <p:cNvPr id="7" name="Content Placeholder 6">
+            <a:extLst>
+              <a:ext uri="{FF2B5EF4-FFF2-40B4-BE49-F238E27FC236}">
+                <a16:creationId xmlns:a16="http://schemas.microsoft.com/office/drawing/2014/main" id="{9B7BB463-606A-8DAC-AB49-7DAA99561F4A}"/>
+              </a:ext>
+            </a:extLst>
+          </p:cNvPr>
+          <p:cNvSpPr>
+            <a:spLocks noGrp="1"/>
+          </p:cNvSpPr>
+          <p:nvPr>
+            <p:ph idx="1"/>
+          </p:nvPr>
+        </p:nvSpPr>
+        <p:spPr/>
+        <p:txBody>
+          <a:bodyPr/>
+          <a:lstStyle/>
+          <a:p>
+            <a:endParaRPr lang="en-US"/>
+          </a:p>
+        </p:txBody>
+      </p:sp>
+      <p:pic>
+        <p:nvPicPr>
+          <p:cNvPr id="10" name="Picture 9">
+            <a:extLst>
+              <a:ext uri="{FF2B5EF4-FFF2-40B4-BE49-F238E27FC236}">
+                <a16:creationId xmlns:a16="http://schemas.microsoft.com/office/drawing/2014/main" id="{2157A6D2-CFF3-6FF2-A889-4E51EBF4E898}"/>
+              </a:ext>
+            </a:extLst>
+          </p:cNvPr>
+          <p:cNvPicPr>
+            <a:picLocks noChangeAspect="1"/>
+          </p:cNvPicPr>
+          <p:nvPr/>
+        </p:nvPicPr>
+        <p:blipFill>
+          <a:blip r:embed="rId2"/>
+          <a:stretch>
+            <a:fillRect/>
+          </a:stretch>
+        </p:blipFill>
+        <p:spPr>
+          <a:xfrm>
+            <a:off x="0" y="1027906"/>
+            <a:ext cx="12192000" cy="4689231"/>
+          </a:xfrm>
+          <a:prstGeom prst="rect">
+            <a:avLst/>
+          </a:prstGeom>
+        </p:spPr>
+      </p:pic>
+    </p:spTree>
+    <p:extLst>
+      <p:ext uri="{BB962C8B-B14F-4D97-AF65-F5344CB8AC3E}">
+        <p14:creationId xmlns:p14="http://schemas.microsoft.com/office/powerpoint/2010/main" val="3178249689"/>
+      </p:ext>
+    </p:extLst>
+  </p:cSld>
+  <p:clrMapOvr>
+    <a:masterClrMapping/>
+  </p:clrMapOvr>
+</p:sld>
+</file>
+
+<file path=ppt/slides/slide3.xml><?xml version="1.0" encoding="utf-8"?>
+<p:sld xmlns:a="http://schemas.openxmlformats.org/drawingml/2006/main" xmlns:r="http://schemas.openxmlformats.org/officeDocument/2006/relationships" xmlns:p="http://schemas.openxmlformats.org/presentationml/2006/main">
+  <p:cSld>
+    <p:spTree>
+      <p:nvGrpSpPr>
+        <p:cNvPr id="1" name=""/>
+        <p:cNvGrpSpPr/>
+        <p:nvPr/>
+      </p:nvGrpSpPr>
+      <p:grpSpPr>
+        <a:xfrm>
+          <a:off x="0" y="0"/>
+          <a:ext cx="0" cy="0"/>
+          <a:chOff x="0" y="0"/>
+          <a:chExt cx="0" cy="0"/>
+        </a:xfrm>
+      </p:grpSpPr>
+      <p:sp>
+        <p:nvSpPr>
+          <p:cNvPr id="2" name="Title 1">
+            <a:extLst>
+              <a:ext uri="{FF2B5EF4-FFF2-40B4-BE49-F238E27FC236}">
+                <a16:creationId xmlns:a16="http://schemas.microsoft.com/office/drawing/2014/main" id="{3F961845-EC97-0315-5E8F-6C5D71DB6279}"/>
+              </a:ext>
+            </a:extLst>
+          </p:cNvPr>
+          <p:cNvSpPr>
+            <a:spLocks noGrp="1"/>
+          </p:cNvSpPr>
+          <p:nvPr>
+            <p:ph type="ctrTitle"/>
+          </p:nvPr>
+        </p:nvSpPr>
+        <p:spPr/>
+        <p:txBody>
+          <a:bodyPr/>
+          <a:lstStyle/>
+          <a:p>
+            <a:endParaRPr lang="en-US"/>
+          </a:p>
+        </p:txBody>
+      </p:sp>
+      <p:sp>
+        <p:nvSpPr>
+          <p:cNvPr id="5" name="Subtitle 4">
+            <a:extLst>
+              <a:ext uri="{FF2B5EF4-FFF2-40B4-BE49-F238E27FC236}">
+                <a16:creationId xmlns:a16="http://schemas.microsoft.com/office/drawing/2014/main" id="{E7ABC801-7AE2-2E92-65F6-DD9ECA22BD46}"/>
+              </a:ext>
+            </a:extLst>
+          </p:cNvPr>
+          <p:cNvSpPr>
+            <a:spLocks noGrp="1"/>
+          </p:cNvSpPr>
+          <p:nvPr>
+            <p:ph type="subTitle" idx="1"/>
+          </p:nvPr>
+        </p:nvSpPr>
+        <p:spPr>
+          <a:xfrm>
+            <a:off x="1409700" y="4727576"/>
+            <a:ext cx="9144000" cy="1655762"/>
+          </a:xfrm>
+        </p:spPr>
+        <p:txBody>
+          <a:bodyPr/>
+          <a:lstStyle/>
+          <a:p>
+            <a:r>
+              <a:rPr lang="en-US" dirty="0"/>
+              <a:t>N-BEATS RMSE: 32.769859313964844</a:t>
+            </a:r>
+          </a:p>
+          <a:p>
+            <a:r>
+              <a:rPr lang="en-US" dirty="0"/>
+              <a:t>N-HITS RMSE: 44.134361267089844</a:t>
+            </a:r>
+          </a:p>
+        </p:txBody>
+      </p:sp>
+      <p:pic>
+        <p:nvPicPr>
+          <p:cNvPr id="8" name="Picture 7">
+            <a:extLst>
+              <a:ext uri="{FF2B5EF4-FFF2-40B4-BE49-F238E27FC236}">
+                <a16:creationId xmlns:a16="http://schemas.microsoft.com/office/drawing/2014/main" id="{F6820FDE-1699-65D5-D866-4C0F119F8822}"/>
+              </a:ext>
+            </a:extLst>
+          </p:cNvPr>
+          <p:cNvPicPr>
+            <a:picLocks noChangeAspect="1"/>
+          </p:cNvPicPr>
+          <p:nvPr/>
+        </p:nvPicPr>
+        <p:blipFill>
+          <a:blip r:embed="rId2"/>
+          <a:stretch>
+            <a:fillRect/>
+          </a:stretch>
+        </p:blipFill>
+        <p:spPr>
+          <a:xfrm>
+            <a:off x="0" y="260350"/>
+            <a:ext cx="12192000" cy="4267200"/>
+          </a:xfrm>
+          <a:prstGeom prst="rect">
+            <a:avLst/>
+          </a:prstGeom>
+        </p:spPr>
+      </p:pic>
+    </p:spTree>
+    <p:extLst>
+      <p:ext uri="{BB962C8B-B14F-4D97-AF65-F5344CB8AC3E}">
+        <p14:creationId xmlns:p14="http://schemas.microsoft.com/office/powerpoint/2010/main" val="425077219"/>
+      </p:ext>
+    </p:extLst>
+  </p:cSld>
+  <p:clrMapOvr>
+    <a:masterClrMapping/>
+  </p:clrMapOvr>
+</p:sld>
+</file>
+
+<file path=ppt/slides/slide4.xml><?xml version="1.0" encoding="utf-8"?>
+<p:sld xmlns:a="http://schemas.openxmlformats.org/drawingml/2006/main" xmlns:r="http://schemas.openxmlformats.org/officeDocument/2006/relationships" xmlns:p="http://schemas.openxmlformats.org/presentationml/2006/main">
+  <p:cSld>
+    <p:spTree>
+      <p:nvGrpSpPr>
+        <p:cNvPr id="1" name=""/>
+        <p:cNvGrpSpPr/>
+        <p:nvPr/>
+      </p:nvGrpSpPr>
+      <p:grpSpPr>
+        <a:xfrm>
+          <a:off x="0" y="0"/>
+          <a:ext cx="0" cy="0"/>
+          <a:chOff x="0" y="0"/>
+          <a:chExt cx="0" cy="0"/>
+        </a:xfrm>
+      </p:grpSpPr>
+      <p:sp>
+        <p:nvSpPr>
+          <p:cNvPr id="2" name="Title 1">
+            <a:extLst>
+              <a:ext uri="{FF2B5EF4-FFF2-40B4-BE49-F238E27FC236}">
+                <a16:creationId xmlns:a16="http://schemas.microsoft.com/office/drawing/2014/main" id="{3F961845-EC97-0315-5E8F-6C5D71DB6279}"/>
+              </a:ext>
+            </a:extLst>
+          </p:cNvPr>
+          <p:cNvSpPr>
+            <a:spLocks noGrp="1"/>
+          </p:cNvSpPr>
+          <p:nvPr>
+            <p:ph type="ctrTitle"/>
+          </p:nvPr>
+        </p:nvSpPr>
+        <p:spPr/>
+        <p:txBody>
+          <a:bodyPr/>
+          <a:lstStyle/>
+          <a:p>
+            <a:endParaRPr lang="en-US" dirty="0"/>
+          </a:p>
+        </p:txBody>
+      </p:sp>
+      <p:sp>
+        <p:nvSpPr>
+          <p:cNvPr id="4" name="Subtitle 3">
+            <a:extLst>
+              <a:ext uri="{FF2B5EF4-FFF2-40B4-BE49-F238E27FC236}">
+                <a16:creationId xmlns:a16="http://schemas.microsoft.com/office/drawing/2014/main" id="{316465CE-7810-224D-D9BE-DC6006012C75}"/>
+              </a:ext>
+            </a:extLst>
+          </p:cNvPr>
+          <p:cNvSpPr>
+            <a:spLocks noGrp="1"/>
+          </p:cNvSpPr>
+          <p:nvPr>
+            <p:ph type="subTitle" idx="1"/>
+          </p:nvPr>
+        </p:nvSpPr>
+        <p:spPr>
+          <a:xfrm>
+            <a:off x="1866078" y="4561682"/>
+            <a:ext cx="9144000" cy="1655762"/>
+          </a:xfrm>
+        </p:spPr>
+        <p:txBody>
+          <a:bodyPr/>
+          <a:lstStyle/>
+          <a:p>
+            <a:r>
+              <a:rPr lang="en-US" dirty="0"/>
+              <a:t>N-BEATS RMSE: 32.67506790161133</a:t>
+            </a:r>
+          </a:p>
+          <a:p>
+            <a:r>
+              <a:rPr lang="en-US" dirty="0"/>
+              <a:t>N-HITS RMSE: 46.136436462402344</a:t>
+            </a:r>
+          </a:p>
+        </p:txBody>
+      </p:sp>
+      <p:pic>
+        <p:nvPicPr>
+          <p:cNvPr id="7" name="Picture 6">
+            <a:extLst>
+              <a:ext uri="{FF2B5EF4-FFF2-40B4-BE49-F238E27FC236}">
+                <a16:creationId xmlns:a16="http://schemas.microsoft.com/office/drawing/2014/main" id="{9BC7CF8C-F487-100E-E35D-C57CF2E2EEC4}"/>
+              </a:ext>
+            </a:extLst>
+          </p:cNvPr>
+          <p:cNvPicPr>
+            <a:picLocks noChangeAspect="1"/>
+          </p:cNvPicPr>
+          <p:nvPr/>
+        </p:nvPicPr>
+        <p:blipFill>
+          <a:blip r:embed="rId2"/>
+          <a:stretch>
+            <a:fillRect/>
+          </a:stretch>
+        </p:blipFill>
+        <p:spPr>
+          <a:xfrm>
+            <a:off x="46232" y="162718"/>
+            <a:ext cx="12192000" cy="4267200"/>
+          </a:xfrm>
+          <a:prstGeom prst="rect">
+            <a:avLst/>
+          </a:prstGeom>
+        </p:spPr>
+      </p:pic>
+    </p:spTree>
+    <p:extLst>
+      <p:ext uri="{BB962C8B-B14F-4D97-AF65-F5344CB8AC3E}">
+        <p14:creationId xmlns:p14="http://schemas.microsoft.com/office/powerpoint/2010/main" val="1083436609"/>
+      </p:ext>
+    </p:extLst>
+  </p:cSld>
+  <p:clrMapOvr>
+    <a:masterClrMapping/>
+  </p:clrMapOvr>
+</p:sld>
+</file>
+
+<file path=ppt/slides/slide5.xml><?xml version="1.0" encoding="utf-8"?>
+<p:sld xmlns:a="http://schemas.openxmlformats.org/drawingml/2006/main" xmlns:r="http://schemas.openxmlformats.org/officeDocument/2006/relationships" xmlns:p="http://schemas.openxmlformats.org/presentationml/2006/main">
+  <p:cSld>
+    <p:spTree>
+      <p:nvGrpSpPr>
+        <p:cNvPr id="1" name=""/>
+        <p:cNvGrpSpPr/>
+        <p:nvPr/>
+      </p:nvGrpSpPr>
+      <p:grpSpPr>
+        <a:xfrm>
+          <a:off x="0" y="0"/>
+          <a:ext cx="0" cy="0"/>
+          <a:chOff x="0" y="0"/>
+          <a:chExt cx="0" cy="0"/>
+        </a:xfrm>
+      </p:grpSpPr>
+      <p:sp>
+        <p:nvSpPr>
+          <p:cNvPr id="2" name="Title 1">
+            <a:extLst>
+              <a:ext uri="{FF2B5EF4-FFF2-40B4-BE49-F238E27FC236}">
+                <a16:creationId xmlns:a16="http://schemas.microsoft.com/office/drawing/2014/main" id="{3F961845-EC97-0315-5E8F-6C5D71DB6279}"/>
+              </a:ext>
+            </a:extLst>
+          </p:cNvPr>
+          <p:cNvSpPr>
+            <a:spLocks noGrp="1"/>
+          </p:cNvSpPr>
+          <p:nvPr>
+            <p:ph type="ctrTitle"/>
+          </p:nvPr>
+        </p:nvSpPr>
+        <p:spPr/>
+        <p:txBody>
+          <a:bodyPr/>
+          <a:lstStyle/>
+          <a:p>
+            <a:endParaRPr lang="en-US" dirty="0"/>
+          </a:p>
+        </p:txBody>
+      </p:sp>
+      <p:sp>
+        <p:nvSpPr>
+          <p:cNvPr id="4" name="Subtitle 3">
+            <a:extLst>
+              <a:ext uri="{FF2B5EF4-FFF2-40B4-BE49-F238E27FC236}">
+                <a16:creationId xmlns:a16="http://schemas.microsoft.com/office/drawing/2014/main" id="{316465CE-7810-224D-D9BE-DC6006012C75}"/>
+              </a:ext>
+            </a:extLst>
+          </p:cNvPr>
+          <p:cNvSpPr>
+            <a:spLocks noGrp="1"/>
+          </p:cNvSpPr>
+          <p:nvPr>
+            <p:ph type="subTitle" idx="1"/>
+          </p:nvPr>
+        </p:nvSpPr>
+        <p:spPr>
+          <a:xfrm>
+            <a:off x="1866078" y="4561682"/>
+            <a:ext cx="9144000" cy="1655762"/>
+          </a:xfrm>
+        </p:spPr>
+        <p:txBody>
+          <a:bodyPr/>
+          <a:lstStyle/>
+          <a:p>
+            <a:r>
+              <a:rPr lang="en-US" dirty="0"/>
+              <a:t>N-BEATS RMSE: 31.229761123657227</a:t>
+            </a:r>
+          </a:p>
+          <a:p>
+            <a:r>
+              <a:rPr lang="en-US" dirty="0"/>
+              <a:t>N-HITS RMSE: 45.31382369995117</a:t>
+            </a:r>
+          </a:p>
+        </p:txBody>
+      </p:sp>
+      <p:pic>
+        <p:nvPicPr>
+          <p:cNvPr id="5" name="Picture 4">
+            <a:extLst>
+              <a:ext uri="{FF2B5EF4-FFF2-40B4-BE49-F238E27FC236}">
+                <a16:creationId xmlns:a16="http://schemas.microsoft.com/office/drawing/2014/main" id="{E55C69B8-3C2D-634F-0F40-65846631FE6E}"/>
+              </a:ext>
+            </a:extLst>
+          </p:cNvPr>
+          <p:cNvPicPr>
+            <a:picLocks noChangeAspect="1"/>
+          </p:cNvPicPr>
+          <p:nvPr/>
+        </p:nvPicPr>
+        <p:blipFill>
+          <a:blip r:embed="rId2"/>
+          <a:stretch>
+            <a:fillRect/>
+          </a:stretch>
+        </p:blipFill>
+        <p:spPr>
+          <a:xfrm>
+            <a:off x="0" y="162718"/>
+            <a:ext cx="12192000" cy="4267200"/>
+          </a:xfrm>
+          <a:prstGeom prst="rect">
+            <a:avLst/>
+          </a:prstGeom>
+        </p:spPr>
+      </p:pic>
+    </p:spTree>
+    <p:extLst>
+      <p:ext uri="{BB962C8B-B14F-4D97-AF65-F5344CB8AC3E}">
+        <p14:creationId xmlns:p14="http://schemas.microsoft.com/office/powerpoint/2010/main" val="2478482185"/>
+      </p:ext>
+    </p:extLst>
+  </p:cSld>
+  <p:clrMapOvr>
+    <a:masterClrMapping/>
+  </p:clrMapOvr>
+</p:sld>
+</file>
+
+<file path=ppt/slides/slide6.xml><?xml version="1.0" encoding="utf-8"?>
+<p:sld xmlns:a="http://schemas.openxmlformats.org/drawingml/2006/main" xmlns:r="http://schemas.openxmlformats.org/officeDocument/2006/relationships" xmlns:p="http://schemas.openxmlformats.org/presentationml/2006/main">
+  <p:cSld>
+    <p:spTree>
+      <p:nvGrpSpPr>
+        <p:cNvPr id="1" name=""/>
+        <p:cNvGrpSpPr/>
+        <p:nvPr/>
+      </p:nvGrpSpPr>
+      <p:grpSpPr>
+        <a:xfrm>
+          <a:off x="0" y="0"/>
+          <a:ext cx="0" cy="0"/>
+          <a:chOff x="0" y="0"/>
+          <a:chExt cx="0" cy="0"/>
+        </a:xfrm>
+      </p:grpSpPr>
+      <p:sp>
+        <p:nvSpPr>
+          <p:cNvPr id="2" name="Title 1">
+            <a:extLst>
+              <a:ext uri="{FF2B5EF4-FFF2-40B4-BE49-F238E27FC236}">
+                <a16:creationId xmlns:a16="http://schemas.microsoft.com/office/drawing/2014/main" id="{3F961845-EC97-0315-5E8F-6C5D71DB6279}"/>
+              </a:ext>
+            </a:extLst>
+          </p:cNvPr>
+          <p:cNvSpPr>
+            <a:spLocks noGrp="1"/>
+          </p:cNvSpPr>
+          <p:nvPr>
+            <p:ph type="ctrTitle"/>
+          </p:nvPr>
+        </p:nvSpPr>
+        <p:spPr/>
+        <p:txBody>
+          <a:bodyPr/>
+          <a:lstStyle/>
+          <a:p>
+            <a:endParaRPr lang="en-US" dirty="0"/>
+          </a:p>
+        </p:txBody>
+      </p:sp>
+      <p:sp>
+        <p:nvSpPr>
+          <p:cNvPr id="4" name="Subtitle 3">
+            <a:extLst>
+              <a:ext uri="{FF2B5EF4-FFF2-40B4-BE49-F238E27FC236}">
+                <a16:creationId xmlns:a16="http://schemas.microsoft.com/office/drawing/2014/main" id="{316465CE-7810-224D-D9BE-DC6006012C75}"/>
+              </a:ext>
+            </a:extLst>
+          </p:cNvPr>
+          <p:cNvSpPr>
+            <a:spLocks noGrp="1"/>
+          </p:cNvSpPr>
+          <p:nvPr>
+            <p:ph type="subTitle" idx="1"/>
+          </p:nvPr>
+        </p:nvSpPr>
+        <p:spPr>
+          <a:xfrm>
+            <a:off x="1866078" y="4561682"/>
+            <a:ext cx="9144000" cy="1655762"/>
+          </a:xfrm>
+        </p:spPr>
+        <p:txBody>
+          <a:bodyPr/>
+          <a:lstStyle/>
+          <a:p>
+            <a:r>
+              <a:rPr lang="en-US" dirty="0"/>
+              <a:t>N-BEATS RMSE: 30.31711769104004</a:t>
+            </a:r>
+          </a:p>
+          <a:p>
+            <a:r>
+              <a:rPr lang="en-US" dirty="0"/>
+              <a:t>N-HITS RMSE: 39.560123443603516</a:t>
+            </a:r>
+          </a:p>
+        </p:txBody>
+      </p:sp>
+      <p:pic>
+        <p:nvPicPr>
+          <p:cNvPr id="6" name="Picture 5">
+            <a:extLst>
+              <a:ext uri="{FF2B5EF4-FFF2-40B4-BE49-F238E27FC236}">
+                <a16:creationId xmlns:a16="http://schemas.microsoft.com/office/drawing/2014/main" id="{523FE6DE-FB86-2F1F-0EB4-A6EB608E7170}"/>
+              </a:ext>
+            </a:extLst>
+          </p:cNvPr>
+          <p:cNvPicPr>
+            <a:picLocks noChangeAspect="1"/>
+          </p:cNvPicPr>
+          <p:nvPr/>
+        </p:nvPicPr>
+        <p:blipFill>
+          <a:blip r:embed="rId2"/>
+          <a:stretch>
+            <a:fillRect/>
+          </a:stretch>
+        </p:blipFill>
+        <p:spPr>
+          <a:xfrm>
+            <a:off x="555145" y="388127"/>
+            <a:ext cx="12192000" cy="4267200"/>
+          </a:xfrm>
+          <a:prstGeom prst="rect">
+            <a:avLst/>
+          </a:prstGeom>
+        </p:spPr>
+      </p:pic>
+    </p:spTree>
+    <p:extLst>
+      <p:ext uri="{BB962C8B-B14F-4D97-AF65-F5344CB8AC3E}">
+        <p14:creationId xmlns:p14="http://schemas.microsoft.com/office/powerpoint/2010/main" val="2637813003"/>
+      </p:ext>
+    </p:extLst>
+  </p:cSld>
+  <p:clrMapOvr>
+    <a:masterClrMapping/>
+  </p:clrMapOvr>
+</p:sld>
+</file>
+
+<file path=ppt/slides/slide7.xml><?xml version="1.0" encoding="utf-8"?>
+<p:sld xmlns:a="http://schemas.openxmlformats.org/drawingml/2006/main" xmlns:r="http://schemas.openxmlformats.org/officeDocument/2006/relationships" xmlns:p="http://schemas.openxmlformats.org/presentationml/2006/main">
+  <p:cSld>
+    <p:spTree>
+      <p:nvGrpSpPr>
+        <p:cNvPr id="1" name=""/>
+        <p:cNvGrpSpPr/>
+        <p:nvPr/>
+      </p:nvGrpSpPr>
+      <p:grpSpPr>
+        <a:xfrm>
+          <a:off x="0" y="0"/>
+          <a:ext cx="0" cy="0"/>
+          <a:chOff x="0" y="0"/>
+          <a:chExt cx="0" cy="0"/>
+        </a:xfrm>
+      </p:grpSpPr>
+      <p:sp>
+        <p:nvSpPr>
+          <p:cNvPr id="2" name="Title 1">
+            <a:extLst>
+              <a:ext uri="{FF2B5EF4-FFF2-40B4-BE49-F238E27FC236}">
+                <a16:creationId xmlns:a16="http://schemas.microsoft.com/office/drawing/2014/main" id="{3F961845-EC97-0315-5E8F-6C5D71DB6279}"/>
+              </a:ext>
+            </a:extLst>
+          </p:cNvPr>
+          <p:cNvSpPr>
+            <a:spLocks noGrp="1"/>
+          </p:cNvSpPr>
+          <p:nvPr>
+            <p:ph type="ctrTitle"/>
+          </p:nvPr>
+        </p:nvSpPr>
+        <p:spPr/>
+        <p:txBody>
+          <a:bodyPr/>
+          <a:lstStyle/>
+          <a:p>
+            <a:endParaRPr lang="en-US" dirty="0"/>
+          </a:p>
+        </p:txBody>
+      </p:sp>
+      <p:sp>
+        <p:nvSpPr>
+          <p:cNvPr id="4" name="Subtitle 3">
+            <a:extLst>
+              <a:ext uri="{FF2B5EF4-FFF2-40B4-BE49-F238E27FC236}">
+                <a16:creationId xmlns:a16="http://schemas.microsoft.com/office/drawing/2014/main" id="{316465CE-7810-224D-D9BE-DC6006012C75}"/>
+              </a:ext>
+            </a:extLst>
+          </p:cNvPr>
+          <p:cNvSpPr>
+            <a:spLocks noGrp="1"/>
+          </p:cNvSpPr>
+          <p:nvPr>
+            <p:ph type="subTitle" idx="1"/>
+          </p:nvPr>
+        </p:nvSpPr>
+        <p:spPr>
+          <a:xfrm>
+            <a:off x="1866078" y="4561682"/>
+            <a:ext cx="9144000" cy="1655762"/>
+          </a:xfrm>
+        </p:spPr>
+        <p:txBody>
+          <a:bodyPr/>
+          <a:lstStyle/>
+          <a:p>
+            <a:r>
+              <a:rPr lang="en-US" dirty="0"/>
+              <a:t>N-BEATS RMSE: 29.680870056152344</a:t>
+            </a:r>
+          </a:p>
+          <a:p>
+            <a:r>
+              <a:rPr lang="en-US" dirty="0"/>
+              <a:t>N-HITS RMSE: 33.61145782470703</a:t>
+            </a:r>
+          </a:p>
+        </p:txBody>
+      </p:sp>
+      <p:pic>
+        <p:nvPicPr>
+          <p:cNvPr id="6" name="Picture 5">
+            <a:extLst>
+              <a:ext uri="{FF2B5EF4-FFF2-40B4-BE49-F238E27FC236}">
+                <a16:creationId xmlns:a16="http://schemas.microsoft.com/office/drawing/2014/main" id="{BAA97D78-0193-346D-5893-71F834DA369C}"/>
+              </a:ext>
+            </a:extLst>
+          </p:cNvPr>
+          <p:cNvPicPr>
+            <a:picLocks noChangeAspect="1"/>
+          </p:cNvPicPr>
+          <p:nvPr/>
+        </p:nvPicPr>
+        <p:blipFill>
+          <a:blip r:embed="rId2"/>
+          <a:stretch>
+            <a:fillRect/>
+          </a:stretch>
+        </p:blipFill>
+        <p:spPr>
+          <a:xfrm>
+            <a:off x="0" y="381000"/>
+            <a:ext cx="12192000" cy="4267200"/>
+          </a:xfrm>
+          <a:prstGeom prst="rect">
+            <a:avLst/>
+          </a:prstGeom>
+        </p:spPr>
+      </p:pic>
+    </p:spTree>
+    <p:extLst>
+      <p:ext uri="{BB962C8B-B14F-4D97-AF65-F5344CB8AC3E}">
+        <p14:creationId xmlns:p14="http://schemas.microsoft.com/office/powerpoint/2010/main" val="1791068705"/>
+      </p:ext>
+    </p:extLst>
+  </p:cSld>
+  <p:clrMapOvr>
+    <a:masterClrMapping/>
+  </p:clrMapOvr>
+</p:sld>
+</file>
+
+<file path=ppt/slides/slide8.xml><?xml version="1.0" encoding="utf-8"?>
+<p:sld xmlns:a="http://schemas.openxmlformats.org/drawingml/2006/main" xmlns:r="http://schemas.openxmlformats.org/officeDocument/2006/relationships" xmlns:p="http://schemas.openxmlformats.org/presentationml/2006/main">
+  <p:cSld>
+    <p:spTree>
+      <p:nvGrpSpPr>
+        <p:cNvPr id="1" name=""/>
+        <p:cNvGrpSpPr/>
+        <p:nvPr/>
+      </p:nvGrpSpPr>
+      <p:grpSpPr>
+        <a:xfrm>
+          <a:off x="0" y="0"/>
+          <a:ext cx="0" cy="0"/>
+          <a:chOff x="0" y="0"/>
+          <a:chExt cx="0" cy="0"/>
+        </a:xfrm>
+      </p:grpSpPr>
+      <p:sp>
+        <p:nvSpPr>
+          <p:cNvPr id="2" name="Title 1">
+            <a:extLst>
+              <a:ext uri="{FF2B5EF4-FFF2-40B4-BE49-F238E27FC236}">
+                <a16:creationId xmlns:a16="http://schemas.microsoft.com/office/drawing/2014/main" id="{3F961845-EC97-0315-5E8F-6C5D71DB6279}"/>
+              </a:ext>
+            </a:extLst>
+          </p:cNvPr>
+          <p:cNvSpPr>
+            <a:spLocks noGrp="1"/>
+          </p:cNvSpPr>
+          <p:nvPr>
+            <p:ph type="ctrTitle"/>
+          </p:nvPr>
+        </p:nvSpPr>
+        <p:spPr/>
+        <p:txBody>
+          <a:bodyPr/>
+          <a:lstStyle/>
+          <a:p>
+            <a:endParaRPr lang="en-US" dirty="0"/>
+          </a:p>
+        </p:txBody>
+      </p:sp>
+      <p:sp>
+        <p:nvSpPr>
+          <p:cNvPr id="4" name="Subtitle 3">
+            <a:extLst>
+              <a:ext uri="{FF2B5EF4-FFF2-40B4-BE49-F238E27FC236}">
+                <a16:creationId xmlns:a16="http://schemas.microsoft.com/office/drawing/2014/main" id="{316465CE-7810-224D-D9BE-DC6006012C75}"/>
+              </a:ext>
+            </a:extLst>
+          </p:cNvPr>
+          <p:cNvSpPr>
+            <a:spLocks noGrp="1"/>
+          </p:cNvSpPr>
+          <p:nvPr>
+            <p:ph type="subTitle" idx="1"/>
+          </p:nvPr>
+        </p:nvSpPr>
+        <p:spPr>
+          <a:xfrm>
+            <a:off x="1866078" y="4561682"/>
+            <a:ext cx="9144000" cy="1655762"/>
+          </a:xfrm>
+        </p:spPr>
+        <p:txBody>
+          <a:bodyPr/>
+          <a:lstStyle/>
+          <a:p>
+            <a:r>
+              <a:rPr lang="en-US" dirty="0"/>
+              <a:t>N-BEATS RMSE: 30.444734573364258</a:t>
+            </a:r>
+          </a:p>
+          <a:p>
+            <a:r>
+              <a:rPr lang="en-US" dirty="0"/>
+              <a:t>N-HITS RMSE: 44.447471618652344</a:t>
+            </a:r>
+          </a:p>
+        </p:txBody>
+      </p:sp>
+      <p:pic>
+        <p:nvPicPr>
+          <p:cNvPr id="5" name="Picture 4">
+            <a:extLst>
+              <a:ext uri="{FF2B5EF4-FFF2-40B4-BE49-F238E27FC236}">
+                <a16:creationId xmlns:a16="http://schemas.microsoft.com/office/drawing/2014/main" id="{00970AD4-3104-FF43-3931-417479FC9058}"/>
+              </a:ext>
+            </a:extLst>
+          </p:cNvPr>
+          <p:cNvPicPr>
+            <a:picLocks noChangeAspect="1"/>
+          </p:cNvPicPr>
+          <p:nvPr/>
+        </p:nvPicPr>
+        <p:blipFill>
+          <a:blip r:embed="rId2"/>
+          <a:stretch>
+            <a:fillRect/>
+          </a:stretch>
+        </p:blipFill>
+        <p:spPr>
+          <a:xfrm>
+            <a:off x="-98676" y="104706"/>
+            <a:ext cx="12192000" cy="4267200"/>
+          </a:xfrm>
+          <a:prstGeom prst="rect">
+            <a:avLst/>
+          </a:prstGeom>
+        </p:spPr>
+      </p:pic>
+    </p:spTree>
+    <p:extLst>
+      <p:ext uri="{BB962C8B-B14F-4D97-AF65-F5344CB8AC3E}">
+        <p14:creationId xmlns:p14="http://schemas.microsoft.com/office/powerpoint/2010/main" val="278247633"/>
+      </p:ext>
+    </p:extLst>
+  </p:cSld>
+  <p:clrMapOvr>
+    <a:masterClrMapping/>
+  </p:clrMapOvr>
+</p:sld>
+</file>
+
+<file path=ppt/slides/slide9.xml><?xml version="1.0" encoding="utf-8"?>
+<p:sld xmlns:a="http://schemas.openxmlformats.org/drawingml/2006/main" xmlns:r="http://schemas.openxmlformats.org/officeDocument/2006/relationships" xmlns:p="http://schemas.openxmlformats.org/presentationml/2006/main">
+  <p:cSld>
+    <p:spTree>
+      <p:nvGrpSpPr>
+        <p:cNvPr id="1" name=""/>
+        <p:cNvGrpSpPr/>
+        <p:nvPr/>
+      </p:nvGrpSpPr>
+      <p:grpSpPr>
+        <a:xfrm>
+          <a:off x="0" y="0"/>
+          <a:ext cx="0" cy="0"/>
+          <a:chOff x="0" y="0"/>
+          <a:chExt cx="0" cy="0"/>
+        </a:xfrm>
+      </p:grpSpPr>
+      <p:sp>
+        <p:nvSpPr>
+          <p:cNvPr id="2" name="Title 1">
+            <a:extLst>
+              <a:ext uri="{FF2B5EF4-FFF2-40B4-BE49-F238E27FC236}">
+                <a16:creationId xmlns:a16="http://schemas.microsoft.com/office/drawing/2014/main" id="{3F961845-EC97-0315-5E8F-6C5D71DB6279}"/>
+              </a:ext>
+            </a:extLst>
+          </p:cNvPr>
+          <p:cNvSpPr>
+            <a:spLocks noGrp="1"/>
+          </p:cNvSpPr>
+          <p:nvPr>
+            <p:ph type="ctrTitle"/>
+          </p:nvPr>
+        </p:nvSpPr>
+        <p:spPr/>
+        <p:txBody>
+          <a:bodyPr/>
+          <a:lstStyle/>
+          <a:p>
+            <a:endParaRPr lang="en-US" dirty="0"/>
+          </a:p>
+        </p:txBody>
+      </p:sp>
+      <p:sp>
+        <p:nvSpPr>
+          <p:cNvPr id="4" name="Subtitle 3">
+            <a:extLst>
+              <a:ext uri="{FF2B5EF4-FFF2-40B4-BE49-F238E27FC236}">
+                <a16:creationId xmlns:a16="http://schemas.microsoft.com/office/drawing/2014/main" id="{316465CE-7810-224D-D9BE-DC6006012C75}"/>
+              </a:ext>
+            </a:extLst>
+          </p:cNvPr>
+          <p:cNvSpPr>
+            <a:spLocks noGrp="1"/>
+          </p:cNvSpPr>
+          <p:nvPr>
+            <p:ph type="subTitle" idx="1"/>
+          </p:nvPr>
+        </p:nvSpPr>
+        <p:spPr>
+          <a:xfrm>
+            <a:off x="1866078" y="4561682"/>
+            <a:ext cx="9144000" cy="1655762"/>
+          </a:xfrm>
+        </p:spPr>
+        <p:txBody>
+          <a:bodyPr/>
+          <a:lstStyle/>
+          <a:p>
+            <a:r>
+              <a:rPr lang="en-US" dirty="0"/>
+              <a:t>N-BEATS RMSE: 15.909482955932617</a:t>
+            </a:r>
+          </a:p>
+          <a:p>
+            <a:r>
+              <a:rPr lang="en-US" dirty="0"/>
+              <a:t>N-HITS RMSE: 29.225482940673828</a:t>
+            </a:r>
+          </a:p>
+        </p:txBody>
+      </p:sp>
+      <p:pic>
+        <p:nvPicPr>
+          <p:cNvPr id="5" name="Picture 4">
+            <a:extLst>
+              <a:ext uri="{FF2B5EF4-FFF2-40B4-BE49-F238E27FC236}">
+                <a16:creationId xmlns:a16="http://schemas.microsoft.com/office/drawing/2014/main" id="{B0427C82-7DD2-D44E-1771-CCE947AABB39}"/>
+              </a:ext>
+            </a:extLst>
+          </p:cNvPr>
+          <p:cNvPicPr>
+            <a:picLocks noChangeAspect="1"/>
+          </p:cNvPicPr>
+          <p:nvPr/>
+        </p:nvPicPr>
+        <p:blipFill>
+          <a:blip r:embed="rId2"/>
+          <a:stretch>
+            <a:fillRect/>
+          </a:stretch>
+        </p:blipFill>
+        <p:spPr>
+          <a:xfrm>
+            <a:off x="0" y="294482"/>
+            <a:ext cx="12192000" cy="4267200"/>
+          </a:xfrm>
+          <a:prstGeom prst="rect">
+            <a:avLst/>
+          </a:prstGeom>
+        </p:spPr>
+      </p:pic>
+    </p:spTree>
+    <p:extLst>
+      <p:ext uri="{BB962C8B-B14F-4D97-AF65-F5344CB8AC3E}">
+        <p14:creationId xmlns:p14="http://schemas.microsoft.com/office/powerpoint/2010/main" val="596351638"/>
       </p:ext>
     </p:extLst>
   </p:cSld>

</xml_diff>